<commit_message>
Updated stacked bar plots
</commit_message>
<xml_diff>
--- a/biodiversity_in_natural_parks.pptx
+++ b/biodiversity_in_natural_parks.pptx
@@ -19,9 +19,10 @@
     <p:sldId id="268" r:id="rId13"/>
     <p:sldId id="273" r:id="rId14"/>
     <p:sldId id="276" r:id="rId15"/>
-    <p:sldId id="260" r:id="rId16"/>
-    <p:sldId id="275" r:id="rId17"/>
-    <p:sldId id="261" r:id="rId18"/>
+    <p:sldId id="277" r:id="rId16"/>
+    <p:sldId id="260" r:id="rId17"/>
+    <p:sldId id="275" r:id="rId18"/>
+    <p:sldId id="261" r:id="rId19"/>
   </p:sldIdLst>
   <p:sldSz cx="12192000" cy="6858000"/>
   <p:notesSz cx="6858000" cy="9144000"/>
@@ -139,6 +140,7 @@
             <p14:sldId id="268"/>
             <p14:sldId id="273"/>
             <p14:sldId id="276"/>
+            <p14:sldId id="277"/>
             <p14:sldId id="260"/>
             <p14:sldId id="275"/>
             <p14:sldId id="261"/>
@@ -3718,7 +3720,7 @@
             <a:fld id="{5923F103-BC34-4FE4-A40E-EDDEECFDA5D0}" type="datetimeFigureOut">
               <a:rPr lang="en-US" smtClean="0"/>
               <a:pPr/>
-              <a:t>1/31/2024</a:t>
+              <a:t>2/7/2024</a:t>
             </a:fld>
             <a:endParaRPr lang="en-US" dirty="0"/>
           </a:p>
@@ -3924,7 +3926,7 @@
           <a:p>
             <a:fld id="{53086D93-FCAC-47E0-A2EE-787E62CA814C}" type="datetimeFigureOut">
               <a:rPr lang="en-US" smtClean="0"/>
-              <a:t>1/31/2024</a:t>
+              <a:t>2/7/2024</a:t>
             </a:fld>
             <a:endParaRPr lang="en-US" dirty="0"/>
           </a:p>
@@ -4105,7 +4107,7 @@
           <a:p>
             <a:fld id="{CDA879A6-0FD0-4734-A311-86BFCA472E6E}" type="datetimeFigureOut">
               <a:rPr lang="en-US" smtClean="0"/>
-              <a:t>1/31/2024</a:t>
+              <a:t>2/7/2024</a:t>
             </a:fld>
             <a:endParaRPr lang="en-US" dirty="0"/>
           </a:p>
@@ -4388,7 +4390,7 @@
           <a:p>
             <a:fld id="{5C12C299-16B2-4475-990D-751901EACC14}" type="datetimeFigureOut">
               <a:rPr lang="en-US" dirty="0"/>
-              <a:t>1/31/2024</a:t>
+              <a:t>2/7/2024</a:t>
             </a:fld>
             <a:endParaRPr lang="en-US" dirty="0"/>
           </a:p>
@@ -4559,7 +4561,7 @@
           <a:p>
             <a:fld id="{19C9CA7B-DFD4-44B5-8C60-D14B8CD1FB59}" type="datetimeFigureOut">
               <a:rPr lang="en-US" smtClean="0"/>
-              <a:t>1/31/2024</a:t>
+              <a:t>2/7/2024</a:t>
             </a:fld>
             <a:endParaRPr lang="en-US" dirty="0"/>
           </a:p>
@@ -8229,7 +8231,7 @@
           <a:p>
             <a:fld id="{F34E6425-0181-43F2-84FC-787E803FD2F8}" type="datetimeFigureOut">
               <a:rPr lang="en-US" smtClean="0"/>
-              <a:t>1/31/2024</a:t>
+              <a:t>2/7/2024</a:t>
             </a:fld>
             <a:endParaRPr lang="en-US" dirty="0"/>
           </a:p>
@@ -8502,7 +8504,7 @@
           <a:p>
             <a:fld id="{3BDB8791-F1B0-41E7-B7FD-A781E65C4266}" type="datetimeFigureOut">
               <a:rPr lang="en-US" smtClean="0"/>
-              <a:t>1/31/2024</a:t>
+              <a:t>2/7/2024</a:t>
             </a:fld>
             <a:endParaRPr lang="en-US" dirty="0"/>
           </a:p>
@@ -8906,7 +8908,7 @@
           <a:p>
             <a:fld id="{5FDD63B2-E120-4ED8-B27B-C685F510A5FE}" type="datetimeFigureOut">
               <a:rPr lang="en-US" smtClean="0"/>
-              <a:t>1/31/2024</a:t>
+              <a:t>2/7/2024</a:t>
             </a:fld>
             <a:endParaRPr lang="en-US" dirty="0"/>
           </a:p>
@@ -9025,7 +9027,7 @@
           <a:p>
             <a:fld id="{7AA18ACC-A947-437B-A130-35BD54FDF1E9}" type="datetimeFigureOut">
               <a:rPr lang="en-US" smtClean="0"/>
-              <a:t>1/31/2024</a:t>
+              <a:t>2/7/2024</a:t>
             </a:fld>
             <a:endParaRPr lang="en-US" dirty="0"/>
           </a:p>
@@ -9121,7 +9123,7 @@
           <a:p>
             <a:fld id="{7C8D7E02-BCB8-4D50-A234-369438C08659}" type="datetimeFigureOut">
               <a:rPr lang="en-US" smtClean="0"/>
-              <a:t>1/31/2024</a:t>
+              <a:t>2/7/2024</a:t>
             </a:fld>
             <a:endParaRPr lang="en-US" dirty="0"/>
           </a:p>
@@ -9412,7 +9414,7 @@
           <a:p>
             <a:fld id="{76E86A4C-8E40-4F87-A4F0-01A0687C5742}" type="datetimeFigureOut">
               <a:rPr lang="en-US" smtClean="0"/>
-              <a:t>1/31/2024</a:t>
+              <a:t>2/7/2024</a:t>
             </a:fld>
             <a:endParaRPr lang="en-US" dirty="0"/>
           </a:p>
@@ -9693,7 +9695,7 @@
           <a:p>
             <a:fld id="{35E72C73-2D91-4E12-BA25-F0AA0C03599B}" type="datetimeFigureOut">
               <a:rPr lang="en-US" smtClean="0"/>
-              <a:t>1/31/2024</a:t>
+              <a:t>2/7/2024</a:t>
             </a:fld>
             <a:endParaRPr lang="en-US" dirty="0"/>
           </a:p>
@@ -9944,7 +9946,7 @@
           <a:p>
             <a:fld id="{2BE451C3-0FF4-47C4-B829-773ADF60F88C}" type="datetimeFigureOut">
               <a:rPr lang="en-US" smtClean="0"/>
-              <a:t>1/31/2024</a:t>
+              <a:t>2/7/2024</a:t>
             </a:fld>
             <a:endParaRPr lang="en-US" dirty="0"/>
           </a:p>
@@ -11235,31 +11237,31 @@
       </p:grpSpPr>
       <p:pic>
         <p:nvPicPr>
-          <p:cNvPr id="5" name="Marcador de contenido 4" descr="Gráfico, Gráfico de barras&#10;&#10;Descripción generada automáticamente">
+          <p:cNvPr id="8" name="Imagen 7">
             <a:extLst>
               <a:ext uri="{FF2B5EF4-FFF2-40B4-BE49-F238E27FC236}">
-                <a16:creationId xmlns:a16="http://schemas.microsoft.com/office/drawing/2014/main" id="{DD272C36-6F28-35CF-7DFE-96CE5BA6B9B6}"/>
+                <a16:creationId xmlns:a16="http://schemas.microsoft.com/office/drawing/2014/main" id="{E526EA3A-5519-546A-2464-D0F00CEE12D1}"/>
               </a:ext>
             </a:extLst>
           </p:cNvPr>
           <p:cNvPicPr>
-            <a:picLocks noGrp="1" noChangeAspect="1"/>
+            <a:picLocks noChangeAspect="1"/>
           </p:cNvPicPr>
-          <p:nvPr>
-            <p:ph idx="4294967295"/>
-          </p:nvPr>
+          <p:nvPr/>
         </p:nvPicPr>
         <p:blipFill>
           <a:blip r:embed="rId2"/>
-          <a:stretch>
-            <a:fillRect/>
-          </a:stretch>
+          <a:srcRect/>
+          <a:stretch/>
         </p:blipFill>
         <p:spPr>
           <a:xfrm>
-            <a:off x="590655" y="228600"/>
-            <a:ext cx="11010690" cy="6400800"/>
+            <a:off x="1620003" y="758946"/>
+            <a:ext cx="8951994" cy="5340107"/>
           </a:xfrm>
+          <a:prstGeom prst="rect">
+            <a:avLst/>
+          </a:prstGeom>
         </p:spPr>
       </p:pic>
     </p:spTree>
@@ -11294,19 +11296,76 @@
       </p:grpSpPr>
       <p:pic>
         <p:nvPicPr>
-          <p:cNvPr id="5" name="Marcador de contenido 4" descr="Gráfico, Gráfico de barras&#10;&#10;Descripción generada automáticamente">
+          <p:cNvPr id="4" name="Imagen 3">
             <a:extLst>
               <a:ext uri="{FF2B5EF4-FFF2-40B4-BE49-F238E27FC236}">
-                <a16:creationId xmlns:a16="http://schemas.microsoft.com/office/drawing/2014/main" id="{F3A12DE0-FE34-0EF4-2170-46692E24DCF7}"/>
+                <a16:creationId xmlns:a16="http://schemas.microsoft.com/office/drawing/2014/main" id="{FBC2E4E5-4D59-53D0-EC25-8E4F3CEDFC11}"/>
               </a:ext>
             </a:extLst>
           </p:cNvPr>
           <p:cNvPicPr>
-            <a:picLocks noGrp="1" noChangeAspect="1"/>
+            <a:picLocks noChangeAspect="1"/>
           </p:cNvPicPr>
-          <p:nvPr>
-            <p:ph idx="4294967295"/>
-          </p:nvPr>
+          <p:nvPr/>
+        </p:nvPicPr>
+        <p:blipFill>
+          <a:blip r:embed="rId2"/>
+          <a:srcRect/>
+          <a:stretch/>
+        </p:blipFill>
+        <p:spPr>
+          <a:xfrm>
+            <a:off x="1620003" y="758946"/>
+            <a:ext cx="8951994" cy="5340107"/>
+          </a:xfrm>
+          <a:prstGeom prst="rect">
+            <a:avLst/>
+          </a:prstGeom>
+        </p:spPr>
+      </p:pic>
+    </p:spTree>
+    <p:extLst>
+      <p:ext uri="{BB962C8B-B14F-4D97-AF65-F5344CB8AC3E}">
+        <p14:creationId xmlns:p14="http://schemas.microsoft.com/office/powerpoint/2010/main" val="1278291049"/>
+      </p:ext>
+    </p:extLst>
+  </p:cSld>
+  <p:clrMapOvr>
+    <a:masterClrMapping/>
+  </p:clrMapOvr>
+</p:sld>
+</file>
+
+<file path=ppt/slides/slide16.xml><?xml version="1.0" encoding="utf-8"?>
+<p:sld xmlns:a="http://schemas.openxmlformats.org/drawingml/2006/main" xmlns:r="http://schemas.openxmlformats.org/officeDocument/2006/relationships" xmlns:p="http://schemas.openxmlformats.org/presentationml/2006/main">
+  <p:cSld>
+    <p:spTree>
+      <p:nvGrpSpPr>
+        <p:cNvPr id="1" name=""/>
+        <p:cNvGrpSpPr/>
+        <p:nvPr/>
+      </p:nvGrpSpPr>
+      <p:grpSpPr>
+        <a:xfrm>
+          <a:off x="0" y="0"/>
+          <a:ext cx="0" cy="0"/>
+          <a:chOff x="0" y="0"/>
+          <a:chExt cx="0" cy="0"/>
+        </a:xfrm>
+      </p:grpSpPr>
+      <p:pic>
+        <p:nvPicPr>
+          <p:cNvPr id="3" name="Imagen 2" descr="Gráfico, Gráfico de barras&#10;&#10;Descripción generada automáticamente">
+            <a:extLst>
+              <a:ext uri="{FF2B5EF4-FFF2-40B4-BE49-F238E27FC236}">
+                <a16:creationId xmlns:a16="http://schemas.microsoft.com/office/drawing/2014/main" id="{3F22E18D-66E9-6F3F-54DF-DAF8E70AE4D3}"/>
+              </a:ext>
+            </a:extLst>
+          </p:cNvPr>
+          <p:cNvPicPr>
+            <a:picLocks noChangeAspect="1"/>
+          </p:cNvPicPr>
+          <p:nvPr/>
         </p:nvPicPr>
         <p:blipFill>
           <a:blip r:embed="rId2"/>
@@ -11316,9 +11375,12 @@
         </p:blipFill>
         <p:spPr>
           <a:xfrm>
-            <a:off x="1487091" y="447486"/>
-            <a:ext cx="9217818" cy="5963028"/>
+            <a:off x="1610859" y="758946"/>
+            <a:ext cx="8970282" cy="5340107"/>
           </a:xfrm>
+          <a:prstGeom prst="rect">
+            <a:avLst/>
+          </a:prstGeom>
         </p:spPr>
       </p:pic>
     </p:spTree>
@@ -11334,7 +11396,7 @@
 </p:sld>
 </file>
 
-<file path=ppt/slides/slide16.xml><?xml version="1.0" encoding="utf-8"?>
+<file path=ppt/slides/slide17.xml><?xml version="1.0" encoding="utf-8"?>
 <p:sld xmlns:a="http://schemas.openxmlformats.org/drawingml/2006/main" xmlns:r="http://schemas.openxmlformats.org/officeDocument/2006/relationships" xmlns:p="http://schemas.openxmlformats.org/presentationml/2006/main">
   <p:cSld>
     <p:bg>
@@ -11402,7 +11464,7 @@
 </p:sld>
 </file>
 
-<file path=ppt/slides/slide17.xml><?xml version="1.0" encoding="utf-8"?>
+<file path=ppt/slides/slide18.xml><?xml version="1.0" encoding="utf-8"?>
 <p:sld xmlns:a="http://schemas.openxmlformats.org/drawingml/2006/main" xmlns:r="http://schemas.openxmlformats.org/officeDocument/2006/relationships" xmlns:p="http://schemas.openxmlformats.org/presentationml/2006/main">
   <p:cSld>
     <p:spTree>

</xml_diff>